<commit_message>
up do lecture 6 - need to add my code to this and clean up
</commit_message>
<xml_diff>
--- a/docs/lectures/lecture_06/06_01_lecture_powerpoint.pptx
+++ b/docs/lectures/lecture_06/06_01_lecture_powerpoint.pptx
@@ -30,8 +30,6 @@
     <p:sldId id="278" r:id="rId24"/>
     <p:sldId id="279" r:id="rId25"/>
     <p:sldId id="280" r:id="rId26"/>
-    <p:sldId id="281" r:id="rId27"/>
-    <p:sldId id="282" r:id="rId28"/>
   </p:sldIdLst>
   <p:sldSz cx="9144000" cy="5143500" type="screen16x9"/>
   <p:notesSz cx="6858000" cy="9144000"/>
@@ -3406,7 +3404,7 @@
             </a:pPr>
             <a:r>
               <a:rPr/>
-              <a:t>Homework take-up</a:t>
+              <a:t>Statistical vs. biological significance</a:t>
             </a:r>
           </a:p>
         </p:txBody>
@@ -3429,87 +3427,74 @@
             <a:pPr lvl="0"/>
             <a:r>
               <a:rPr/>
-              <a:t>Perform 2-sample t-test:</a:t>
+              <a:t>Statistical significance: difference unlikely due to chance</a:t>
+            </a:r>
+          </a:p>
+          <a:p>
+            <a:pPr lvl="0"/>
+            <a:r>
+              <a:rPr/>
+              <a:t>Says nothing about biological significance of difference!</a:t>
+            </a:r>
+          </a:p>
+          <a:p>
+            <a:pPr lvl="0"/>
+            <a:r>
+              <a:rPr/>
+              <a:t>With large sample size can detect very small differences between populations</a:t>
+            </a:r>
+          </a:p>
+          <a:p>
+            <a:pPr lvl="0"/>
+            <a:r>
+              <a:rPr/>
+              <a:t>E.g.: consider 2 snail populations,</a:t>
             </a:r>
           </a:p>
           <a:p>
             <a:pPr lvl="1"/>
             <a:r>
               <a:rPr/>
-              <a:t>pop A: 5.3, 5.6, 4.3, 4.9, 5.3, 4.1, 5.2, 5.0 cm</a:t>
-            </a:r>
-          </a:p>
-          <a:p>
-            <a:pPr lvl="1"/>
-            <a:r>
-              <a:rPr/>
-              <a:t>pop B: 6.1, 4.7, 5.9, 4.7, 6.2, 6.0, 5.4, 4.9 cm</a:t>
-            </a:r>
-          </a:p>
-          <a:p>
-            <a:pPr lvl="0"/>
-            <a:r>
-              <a:rPr/>
-              <a:t>ȳ</a:t>
-            </a:r>
-            <a:r>
-              <a:rPr baseline="-25000"/>
-              <a:t>popA</a:t>
-            </a:r>
-            <a:r>
-              <a:rPr/>
-              <a:t> - ȳ</a:t>
-            </a:r>
-            <a:r>
-              <a:rPr baseline="-25000"/>
-              <a:t>popB</a:t>
-            </a:r>
-            <a:r>
-              <a:rPr/>
-              <a:t> = -0.53</a:t>
-            </a:r>
-          </a:p>
-          <a:p>
-            <a:pPr lvl="0"/>
-            <a:r>
-              <a:rPr/>
-              <a:t>s</a:t>
-            </a:r>
-            <a:r>
-              <a:rPr baseline="-25000"/>
-              <a:t>ȳopA-ȳopB</a:t>
-            </a:r>
-            <a:r>
-              <a:rPr/>
-              <a:t> = 0.29</a:t>
-            </a:r>
-          </a:p>
-          <a:p>
-            <a:pPr lvl="0"/>
-            <a:r>
-              <a:rPr/>
-              <a:t>t = -1.80</a:t>
-            </a:r>
-          </a:p>
-          <a:p>
-            <a:pPr lvl="0"/>
-            <a:r>
-              <a:rPr/>
-              <a:t>df = 14</a:t>
-            </a:r>
-          </a:p>
-          <a:p>
-            <a:pPr lvl="0"/>
-            <a:r>
-              <a:rPr/>
-              <a:t>p (estimated from t-table) = 0.05 &lt; p &lt; 0.1</a:t>
-            </a:r>
-          </a:p>
-          <a:p>
-            <a:pPr lvl="0"/>
-            <a:r>
-              <a:rPr/>
-              <a:t>Writeup: “a 2-tailed, independent 2-sampe t-test showed no significant difference bw beak length of pop A (4.96 cm ± 0.52 SD) and pop B (5.49 ± 0.64) at á=0.05: t(14) =-1.80, p = 0.094”</a:t>
+              <a:t>A and B:</a:t>
+            </a:r>
+          </a:p>
+          <a:p>
+            <a:pPr lvl="2"/>
+            <a:r>
+              <a:rPr/>
+              <a:t>Ho: µ~size A~ = µ~size B~</a:t>
+            </a:r>
+          </a:p>
+          <a:p>
+            <a:pPr lvl="2"/>
+            <a:r>
+              <a:rPr/>
+              <a:t>Ha: µ~size A~ ≠ µ~size B~</a:t>
+            </a:r>
+          </a:p>
+        </p:txBody>
+      </p:sp>
+      <p:sp>
+        <p:nvSpPr>
+          <p:cNvPr id="4" name="Content Placeholder 3"/>
+          <p:cNvSpPr>
+            <a:spLocks noGrp="1"/>
+          </p:cNvSpPr>
+          <p:nvPr>
+            <p:ph idx="2" sz="half"/>
+          </p:nvPr>
+        </p:nvSpPr>
+        <p:spPr/>
+        <p:txBody>
+          <a:bodyPr/>
+          <a:lstStyle/>
+          <a:p>
+            <a:pPr lvl="0" indent="0" marL="0">
+              <a:buNone/>
+            </a:pPr>
+            <a:r>
+              <a:rPr/>
+              <a:t>&lt;!–  –&gt;</a:t>
             </a:r>
           </a:p>
         </p:txBody>
@@ -3564,7 +3549,7 @@
             </a:pPr>
             <a:r>
               <a:rPr/>
-              <a:t>Homework take-up</a:t>
+              <a:t>Statistical vs. biological significance</a:t>
             </a:r>
           </a:p>
         </p:txBody>
@@ -3587,35 +3572,39 @@
             <a:pPr lvl="0"/>
             <a:r>
               <a:rPr/>
-              <a:t>Look through the ecological literature and find an example of a published manuscript that uses either a t-test of one of the tests mentioned in Q2. Provide the following information:</a:t>
+              <a:t>Size of A: 5.05 (± 2.00 SD)mm, size of B: 5.00 (± 2.00 SD)mm</a:t>
+            </a:r>
+          </a:p>
+          <a:p>
+            <a:pPr lvl="0"/>
+            <a:r>
+              <a:rPr/>
+              <a:t>Sample 50, 200, 30,000 individuals from each pop:</a:t>
             </a:r>
           </a:p>
           <a:p>
             <a:pPr lvl="1"/>
             <a:r>
               <a:rPr/>
-              <a:t>Reference for paper</a:t>
+              <a:t>n = 50: t = 0.32, df = 98, p-value = 0.75</a:t>
             </a:r>
           </a:p>
           <a:p>
             <a:pPr lvl="1"/>
             <a:r>
               <a:rPr/>
-              <a:t>Scientific question being addressed</a:t>
+              <a:t>n = 200: t = 0.058, df = 398, p-value = 0.95</a:t>
             </a:r>
           </a:p>
           <a:p>
             <a:pPr lvl="1"/>
             <a:r>
               <a:rPr/>
-              <a:t>Specific hypothesis tested (in mathematical notation)</a:t>
-            </a:r>
-          </a:p>
-          <a:p>
-            <a:pPr lvl="1"/>
-            <a:r>
-              <a:rPr/>
-              <a:t>The results of the t test (t, df, p) and the author’s conclusions</a:t>
+              <a:t>n = 30,000: t = -4.47, df = 59998, p-value = 7.996*10</a:t>
+            </a:r>
+            <a:r>
+              <a:rPr baseline="30000"/>
+              <a:t>-6</a:t>
             </a:r>
           </a:p>
         </p:txBody>
@@ -3693,28 +3682,57 @@
             <a:pPr lvl="0"/>
             <a:r>
               <a:rPr/>
-              <a:t>Statistical significance: difference unlikely due to chance</a:t>
-            </a:r>
-          </a:p>
-          <a:p>
-            <a:pPr lvl="0"/>
-            <a:r>
-              <a:rPr/>
-              <a:t>Says nothing about biological significance of difference!</a:t>
-            </a:r>
-          </a:p>
-          <a:p>
-            <a:pPr lvl="0"/>
-            <a:r>
-              <a:rPr/>
-              <a:t>With large sample size can detect very small differences between populations</a:t>
-            </a:r>
-          </a:p>
-          <a:p>
-            <a:pPr lvl="0"/>
-            <a:r>
-              <a:rPr/>
-              <a:t>E.g.: consider 2 snail populations, A and B: Ho: µ~size A~ = µ~size B~; Ha: µ~size A~ ≠ µ~size B~</a:t>
+              <a:t>Finally, statistically significant difference…</a:t>
+            </a:r>
+          </a:p>
+          <a:p>
+            <a:pPr lvl="0"/>
+            <a:r>
+              <a:rPr/>
+              <a:t>Meaningful? Ecologically significant? Statistics can’t answer this question</a:t>
+            </a:r>
+          </a:p>
+          <a:p>
+            <a:pPr lvl="0"/>
+            <a:r>
+              <a:rPr b="1"/>
+              <a:t>IMPORTANT</a:t>
+            </a:r>
+            <a:r>
+              <a:rPr/>
+              <a:t> to report info that can assess biological significance</a:t>
+            </a:r>
+          </a:p>
+          <a:p>
+            <a:pPr lvl="0"/>
+            <a:r>
+              <a:rPr/>
+              <a:t>“A two-tailed, two-sample independent t-test showed significant difference in size between pop. A (4.99 mm ± 1.99 SD) and pop. B (5.06 mm ± 1.99 SD) at á=0.05 (t = -4.47, df = 59998, p-value &lt; 0.0001).”</a:t>
+            </a:r>
+          </a:p>
+        </p:txBody>
+      </p:sp>
+      <p:sp>
+        <p:nvSpPr>
+          <p:cNvPr id="4" name="Content Placeholder 3"/>
+          <p:cNvSpPr>
+            <a:spLocks noGrp="1"/>
+          </p:cNvSpPr>
+          <p:nvPr>
+            <p:ph idx="2" sz="half"/>
+          </p:nvPr>
+        </p:nvSpPr>
+        <p:spPr/>
+        <p:txBody>
+          <a:bodyPr/>
+          <a:lstStyle/>
+          <a:p>
+            <a:pPr lvl="0" indent="0" marL="0">
+              <a:buNone/>
+            </a:pPr>
+            <a:r>
+              <a:rPr/>
+              <a:t>&lt;!– –&gt;</a:t>
             </a:r>
           </a:p>
         </p:txBody>
@@ -3769,7 +3787,7 @@
             </a:pPr>
             <a:r>
               <a:rPr/>
-              <a:t>Statistical vs. biological significance</a:t>
+              <a:t>Assumptions of parametric tests</a:t>
             </a:r>
           </a:p>
         </p:txBody>
@@ -3792,39 +3810,46 @@
             <a:pPr lvl="0"/>
             <a:r>
               <a:rPr/>
-              <a:t>Size of A: 5.05 (± 2.00 SD)mm, size of B: 5.00 (± 2.00 SD)mm</a:t>
-            </a:r>
-          </a:p>
-          <a:p>
-            <a:pPr lvl="0"/>
-            <a:r>
-              <a:rPr/>
-              <a:t>Sample 50, 200, 30,000 individuals from each pop:</a:t>
-            </a:r>
-          </a:p>
-          <a:p>
-            <a:pPr lvl="1"/>
-            <a:r>
-              <a:rPr/>
-              <a:t>n = 50: t = 0.32, df = 98, p-value = 0.75</a:t>
-            </a:r>
-          </a:p>
-          <a:p>
-            <a:pPr lvl="1"/>
-            <a:r>
-              <a:rPr/>
-              <a:t>n = 200: t = 0.058, df = 398, p-value = 0.95</a:t>
-            </a:r>
-          </a:p>
-          <a:p>
-            <a:pPr lvl="1"/>
-            <a:r>
-              <a:rPr/>
-              <a:t>n = 30,000: t = -4.47, df = 59998, p-value = 7.996*10</a:t>
-            </a:r>
-            <a:r>
-              <a:rPr baseline="30000"/>
-              <a:t>-6</a:t>
+              <a:t>Basic assumptions of parametric t-tests:</a:t>
+            </a:r>
+          </a:p>
+          <a:p>
+            <a:pPr lvl="0"/>
+            <a:r>
+              <a:rPr/>
+              <a:t>Normality, equal variance, random sampling, no outliers</a:t>
+            </a:r>
+          </a:p>
+          <a:p>
+            <a:pPr lvl="0"/>
+            <a:r>
+              <a:rPr/>
+              <a:t>What to do if assumptions are violated?</a:t>
+            </a:r>
+          </a:p>
+        </p:txBody>
+      </p:sp>
+      <p:sp>
+        <p:nvSpPr>
+          <p:cNvPr id="4" name="Content Placeholder 3"/>
+          <p:cNvSpPr>
+            <a:spLocks noGrp="1"/>
+          </p:cNvSpPr>
+          <p:nvPr>
+            <p:ph idx="2" sz="half"/>
+          </p:nvPr>
+        </p:nvSpPr>
+        <p:spPr/>
+        <p:txBody>
+          <a:bodyPr/>
+          <a:lstStyle/>
+          <a:p>
+            <a:pPr lvl="0" indent="0" marL="0">
+              <a:buNone/>
+            </a:pPr>
+            <a:r>
+              <a:rPr/>
+              <a:t>&lt;&gt;</a:t>
             </a:r>
           </a:p>
         </p:txBody>
@@ -3879,7 +3904,7 @@
             </a:pPr>
             <a:r>
               <a:rPr/>
-              <a:t>Statistical vs. biological significance</a:t>
+              <a:t>Homework take-up</a:t>
             </a:r>
           </a:p>
         </p:txBody>
@@ -3902,32 +3927,65 @@
             <a:pPr lvl="0"/>
             <a:r>
               <a:rPr/>
-              <a:t>Finally, statistically significant difference…</a:t>
-            </a:r>
-          </a:p>
-          <a:p>
-            <a:pPr lvl="0"/>
-            <a:r>
-              <a:rPr/>
-              <a:t>Meaningful? Ecologically significant? Statistics can’t answer this question</a:t>
-            </a:r>
-          </a:p>
-          <a:p>
-            <a:pPr lvl="0"/>
-            <a:r>
-              <a:rPr b="1"/>
-              <a:t>IMPORTANT</a:t>
-            </a:r>
-            <a:r>
-              <a:rPr/>
-              <a:t> to report info that can assess biological significance</a:t>
-            </a:r>
-          </a:p>
-          <a:p>
-            <a:pPr lvl="0"/>
-            <a:r>
-              <a:rPr/>
-              <a:t>“A two-tailed, two-sample independent t-test showed significant difference in size between pop. A (4.99 mm ± 1.99 SD) and pop. B (5.06 mm ± 1.99 SD) at á=0.05 (t = -4.47, df = 59998, p-value &lt; 0.0001).”</a:t>
+              <a:t>t-tests have several assumptions. Alternative tests, with more relaxed assumptions, are available to statisticians. In which case would you use the following tests?</a:t>
+            </a:r>
+          </a:p>
+          <a:p>
+            <a:pPr lvl="1"/>
+            <a:r>
+              <a:rPr/>
+              <a:t>Welch’s t-test: </a:t>
+            </a:r>
+            <a:r>
+              <a:rPr i="1"/>
+              <a:t>when distribution normal but variance unequal</a:t>
+            </a:r>
+          </a:p>
+          <a:p>
+            <a:pPr lvl="1"/>
+            <a:r>
+              <a:rPr/>
+              <a:t>Permutation test for two samples: </a:t>
+            </a:r>
+            <a:r>
+              <a:rPr i="1"/>
+              <a:t>when distribution not normal (but both groups should still have similar distributions and ~equal variance)</a:t>
+            </a:r>
+          </a:p>
+          <a:p>
+            <a:pPr lvl="1"/>
+            <a:r>
+              <a:rPr/>
+              <a:t>Mann-Whitney-Wilcoxon test: </a:t>
+            </a:r>
+            <a:r>
+              <a:rPr i="1"/>
+              <a:t>when distribution not normal and/or outliers are present (but both groups should still have similar distributions and ~equal variance)</a:t>
+            </a:r>
+          </a:p>
+        </p:txBody>
+      </p:sp>
+      <p:sp>
+        <p:nvSpPr>
+          <p:cNvPr id="4" name="Content Placeholder 3"/>
+          <p:cNvSpPr>
+            <a:spLocks noGrp="1"/>
+          </p:cNvSpPr>
+          <p:nvPr>
+            <p:ph idx="2" sz="half"/>
+          </p:nvPr>
+        </p:nvSpPr>
+        <p:spPr/>
+        <p:txBody>
+          <a:bodyPr/>
+          <a:lstStyle/>
+          <a:p>
+            <a:pPr lvl="0" indent="0" marL="0">
+              <a:buNone/>
+            </a:pPr>
+            <a:r>
+              <a:rPr/>
+              <a:t>&lt; –&gt;</a:t>
             </a:r>
           </a:p>
         </p:txBody>
@@ -4005,21 +4063,53 @@
             <a:pPr lvl="0"/>
             <a:r>
               <a:rPr/>
-              <a:t>Basic assumptions of parametric t-tests:</a:t>
-            </a:r>
-          </a:p>
-          <a:p>
-            <a:pPr lvl="0"/>
-            <a:r>
-              <a:rPr/>
-              <a:t>Normality, equal variance, random sampling, no outliers</a:t>
-            </a:r>
-          </a:p>
-          <a:p>
-            <a:pPr lvl="0"/>
-            <a:r>
-              <a:rPr/>
-              <a:t>What to do if assumptions are violated?</a:t>
+              <a:t>QQ-plots: tool for assessing normality</a:t>
+            </a:r>
+          </a:p>
+          <a:p>
+            <a:pPr lvl="0"/>
+            <a:r>
+              <a:rPr/>
+              <a:t>On x- theoretical quantiles from SND</a:t>
+            </a:r>
+          </a:p>
+          <a:p>
+            <a:pPr lvl="0"/>
+            <a:r>
+              <a:rPr/>
+              <a:t>On y- ordered sample values</a:t>
+            </a:r>
+          </a:p>
+          <a:p>
+            <a:pPr lvl="0"/>
+            <a:r>
+              <a:rPr/>
+              <a:t>Deviation from normal can be detected as deviation from straight line</a:t>
+            </a:r>
+          </a:p>
+        </p:txBody>
+      </p:sp>
+      <p:sp>
+        <p:nvSpPr>
+          <p:cNvPr id="4" name="Content Placeholder 3"/>
+          <p:cNvSpPr>
+            <a:spLocks noGrp="1"/>
+          </p:cNvSpPr>
+          <p:nvPr>
+            <p:ph idx="2" sz="half"/>
+          </p:nvPr>
+        </p:nvSpPr>
+        <p:spPr/>
+        <p:txBody>
+          <a:bodyPr/>
+          <a:lstStyle/>
+          <a:p>
+            <a:pPr lvl="0" indent="0" marL="0">
+              <a:buNone/>
+            </a:pPr>
+            <a:r>
+              <a:rPr/>
+              <a:t>&lt;!– –&gt;</a:t>
             </a:r>
           </a:p>
         </p:txBody>
@@ -4074,7 +4164,7 @@
             </a:pPr>
             <a:r>
               <a:rPr/>
-              <a:t>Homework take-up</a:t>
+              <a:t>Assumptions of parametric tests</a:t>
             </a:r>
           </a:p>
         </p:txBody>
@@ -4097,40 +4187,7 @@
             <a:pPr lvl="0"/>
             <a:r>
               <a:rPr/>
-              <a:t>t-tests have several assumptions. Alternative tests, with more relaxed assumptions, are available to statisticians. In which case would you use the following tests?</a:t>
-            </a:r>
-          </a:p>
-          <a:p>
-            <a:pPr lvl="1"/>
-            <a:r>
-              <a:rPr/>
-              <a:t>Welch’s t-test: </a:t>
-            </a:r>
-            <a:r>
-              <a:rPr i="1"/>
-              <a:t>when distribution normal but variance unequal</a:t>
-            </a:r>
-          </a:p>
-          <a:p>
-            <a:pPr lvl="1"/>
-            <a:r>
-              <a:rPr/>
-              <a:t>Permutation test for two samples: </a:t>
-            </a:r>
-            <a:r>
-              <a:rPr i="1"/>
-              <a:t>when distribution not normal (but both groups should still have similar distributions and ~equal variance)</a:t>
-            </a:r>
-          </a:p>
-          <a:p>
-            <a:pPr lvl="1"/>
-            <a:r>
-              <a:rPr/>
-              <a:t>Mann-Whitney-Wilcoxon test: </a:t>
-            </a:r>
-            <a:r>
-              <a:rPr i="1"/>
-              <a:t>when distribution not normal and/or outliers are present (but both groups should still have similar distributions and ~equal variance)</a:t>
+              <a:t>In some cases, data can be mathematically “transformed” to meet assumptions of parametric tests</a:t>
             </a:r>
           </a:p>
         </p:txBody>
@@ -4185,7 +4242,7 @@
             </a:pPr>
             <a:r>
               <a:rPr/>
-              <a:t>Assumptions of parametric tests</a:t>
+              <a:t>Robust tests</a:t>
             </a:r>
           </a:p>
         </p:txBody>
@@ -4208,28 +4265,53 @@
             <a:pPr lvl="0"/>
             <a:r>
               <a:rPr/>
-              <a:t>QQ-plots: tool for assessing normality</a:t>
-            </a:r>
-          </a:p>
-          <a:p>
-            <a:pPr lvl="0"/>
-            <a:r>
-              <a:rPr/>
-              <a:t>On x- theoretical quantiles from SND</a:t>
-            </a:r>
-          </a:p>
-          <a:p>
-            <a:pPr lvl="0"/>
-            <a:r>
-              <a:rPr/>
-              <a:t>On y- ordered sample values</a:t>
-            </a:r>
-          </a:p>
-          <a:p>
-            <a:pPr lvl="0"/>
-            <a:r>
-              <a:rPr/>
-              <a:t>Deviation from normal can be detected as deviation from straight line</a:t>
+              <a:t>Welch’s t-test: common “robust” test for means of two populations</a:t>
+            </a:r>
+          </a:p>
+          <a:p>
+            <a:pPr lvl="0"/>
+            <a:r>
+              <a:rPr/>
+              <a:t>Robust to violation of equal variance assumption, deals better with unequal sample size</a:t>
+            </a:r>
+          </a:p>
+          <a:p>
+            <a:pPr lvl="0"/>
+            <a:r>
+              <a:rPr/>
+              <a:t>Parametric test (assumes normal distribution)</a:t>
+            </a:r>
+          </a:p>
+          <a:p>
+            <a:pPr lvl="0"/>
+            <a:r>
+              <a:rPr/>
+              <a:t>Calculates a t statistic but recalculates df based on samples sizes and s</a:t>
+            </a:r>
+          </a:p>
+        </p:txBody>
+      </p:sp>
+      <p:sp>
+        <p:nvSpPr>
+          <p:cNvPr id="4" name="Content Placeholder 3"/>
+          <p:cNvSpPr>
+            <a:spLocks noGrp="1"/>
+          </p:cNvSpPr>
+          <p:nvPr>
+            <p:ph idx="2" sz="half"/>
+          </p:nvPr>
+        </p:nvSpPr>
+        <p:spPr/>
+        <p:txBody>
+          <a:bodyPr/>
+          <a:lstStyle/>
+          <a:p>
+            <a:pPr lvl="0" indent="0" marL="0">
+              <a:buNone/>
+            </a:pPr>
+            <a:r>
+              <a:rPr/>
+              <a:t>&lt;!– –&gt;</a:t>
             </a:r>
           </a:p>
         </p:txBody>
@@ -4284,7 +4366,7 @@
             </a:pPr>
             <a:r>
               <a:rPr/>
-              <a:t>Assumptions of parametric tests</a:t>
+              <a:t>Robust tests</a:t>
             </a:r>
           </a:p>
         </p:txBody>
@@ -4307,7 +4389,88 @@
             <a:pPr lvl="0"/>
             <a:r>
               <a:rPr/>
-              <a:t>In some cases, data can be mathematically “transformed” to meet assumptions of parametric tests</a:t>
+              <a:t>In R:</a:t>
+            </a:r>
+          </a:p>
+          <a:p>
+            <a:pPr lvl="0"/>
+            <a:r>
+              <a:rPr/>
+              <a:t>t.test(y1, y2, var.equal = FALSE, paired = FALSE)</a:t>
+            </a:r>
+          </a:p>
+          <a:p>
+            <a:pPr lvl="0"/>
+            <a:r>
+              <a:rPr/>
+              <a:t>will use the Welch approach</a:t>
+            </a:r>
+          </a:p>
+          <a:p>
+            <a:pPr lvl="0"/>
+            <a:r>
+              <a:rPr/>
+              <a:t>T-test</a:t>
+            </a:r>
+            <a:br/>
+            <a:r>
+              <a:rPr/>
+              <a:t>AvB df= 38 t= -3.62 p= 0.0009</a:t>
+            </a:r>
+          </a:p>
+          <a:p>
+            <a:pPr lvl="0"/>
+            <a:r>
+              <a:rPr/>
+              <a:t>AvC df= 38 t= -2.91 p= 0.005</a:t>
+            </a:r>
+          </a:p>
+          <a:p>
+            <a:pPr lvl="0" indent="0" marL="0">
+              <a:buNone/>
+            </a:pPr>
+            <a:r>
+              <a:rPr/>
+              <a:t>Welch’s</a:t>
+            </a:r>
+          </a:p>
+          <a:p>
+            <a:pPr lvl="0"/>
+            <a:r>
+              <a:rPr/>
+              <a:t>AvB df= 37.9 t= -3.62 p= 0.0009</a:t>
+            </a:r>
+          </a:p>
+          <a:p>
+            <a:pPr lvl="0"/>
+            <a:r>
+              <a:rPr/>
+              <a:t>AvC df= 26.1 t= -2.91 p= 0.007</a:t>
+            </a:r>
+          </a:p>
+        </p:txBody>
+      </p:sp>
+      <p:sp>
+        <p:nvSpPr>
+          <p:cNvPr id="4" name="Content Placeholder 3"/>
+          <p:cNvSpPr>
+            <a:spLocks noGrp="1"/>
+          </p:cNvSpPr>
+          <p:nvPr>
+            <p:ph idx="2" sz="half"/>
+          </p:nvPr>
+        </p:nvSpPr>
+        <p:spPr/>
+        <p:txBody>
+          <a:bodyPr/>
+          <a:lstStyle/>
+          <a:p>
+            <a:pPr lvl="0" indent="0" marL="0">
+              <a:buNone/>
+            </a:pPr>
+            <a:r>
+              <a:rPr/>
+              <a:t>&lt;!–  –&gt;</a:t>
             </a:r>
           </a:p>
         </p:txBody>
@@ -4362,7 +4525,7 @@
             </a:pPr>
             <a:r>
               <a:rPr/>
-              <a:t>Robust tests</a:t>
+              <a:t>Rank based tests</a:t>
             </a:r>
           </a:p>
         </p:txBody>
@@ -4385,28 +4548,36 @@
             <a:pPr lvl="0"/>
             <a:r>
               <a:rPr/>
-              <a:t>Welch’s t-test: common “robust” test for means of two populations</a:t>
-            </a:r>
-          </a:p>
-          <a:p>
-            <a:pPr lvl="0"/>
-            <a:r>
-              <a:rPr/>
-              <a:t>Robust to violation of equal variance assumption, deals better with unequal sample size</a:t>
-            </a:r>
-          </a:p>
-          <a:p>
-            <a:pPr lvl="0"/>
-            <a:r>
-              <a:rPr/>
-              <a:t>Parametric test (assumes normal distribution)</a:t>
-            </a:r>
-          </a:p>
-          <a:p>
-            <a:pPr lvl="0"/>
-            <a:r>
-              <a:rPr/>
-              <a:t>Calculates a t statistic but recalculates df based on samples sizes and s</a:t>
+              <a:t>Rank-based tests: no assumptions about distribution (non-parametric)</a:t>
+            </a:r>
+          </a:p>
+          <a:p>
+            <a:pPr lvl="0"/>
+            <a:r>
+              <a:rPr/>
+              <a:t>Ranks of data: observations assigned ranks, sums (and signs for paired tests) of ranks for groups compared</a:t>
+            </a:r>
+          </a:p>
+          <a:p>
+            <a:pPr lvl="0"/>
+            <a:r>
+              <a:rPr b="1"/>
+              <a:t>Mann-Whitney U test</a:t>
+            </a:r>
+            <a:r>
+              <a:rPr/>
+              <a:t> common alternative to independent samples t-test</a:t>
+            </a:r>
+          </a:p>
+          <a:p>
+            <a:pPr lvl="0"/>
+            <a:r>
+              <a:rPr b="1"/>
+              <a:t>Wilcoxon signed-rank</a:t>
+            </a:r>
+            <a:r>
+              <a:rPr/>
+              <a:t> test is alternative to paired t-test</a:t>
             </a:r>
           </a:p>
         </p:txBody>
@@ -4590,7 +4761,7 @@
             </a:pPr>
             <a:r>
               <a:rPr/>
-              <a:t>Robust tests</a:t>
+              <a:t>Rank based tests</a:t>
             </a:r>
           </a:p>
         </p:txBody>
@@ -4613,7 +4784,48 @@
             <a:pPr lvl="0"/>
             <a:r>
               <a:rPr/>
-              <a:t>In R: t.test(y1, y2, var.equal = FALSE, paired = FALSE) will use the Welch approach</a:t>
+              <a:t>Assumptions: similar distributions for groups, equal variance</a:t>
+            </a:r>
+          </a:p>
+          <a:p>
+            <a:pPr lvl="0"/>
+            <a:r>
+              <a:rPr/>
+              <a:t>Less power than parametric tests</a:t>
+            </a:r>
+          </a:p>
+          <a:p>
+            <a:pPr lvl="0"/>
+            <a:r>
+              <a:rPr/>
+              <a:t>Best when normality assumption can not be met by transformation (weird distribution) or large outliers</a:t>
+            </a:r>
+          </a:p>
+          <a:p>
+            <a:pPr lvl="0" indent="0" marL="0">
+              <a:buNone/>
+            </a:pPr>
+            <a:r>
+              <a:rPr/>
+              <a:t>A: n= 15, y= 8, s= 4 B : n= 15, y= 10, s= 5</a:t>
+            </a:r>
+          </a:p>
+          <a:p>
+            <a:pPr lvl="0" indent="0" marL="0">
+              <a:buNone/>
+            </a:pPr>
+            <a:r>
+              <a:rPr/>
+              <a:t>Approach A vs. B</a:t>
+            </a:r>
+          </a:p>
+          <a:p>
+            <a:pPr lvl="0" indent="0" marL="0">
+              <a:buNone/>
+            </a:pPr>
+            <a:r>
+              <a:rPr/>
+              <a:t>T-test df= 28 t= -3.53 p= 0.0014 M-W U (Wilcoxon’s) W= 41 p= 0.002</a:t>
             </a:r>
           </a:p>
         </p:txBody>
@@ -4668,7 +4880,7 @@
             </a:pPr>
             <a:r>
               <a:rPr/>
-              <a:t>Rank based tests</a:t>
+              <a:t>Permutation tests</a:t>
             </a:r>
           </a:p>
         </p:txBody>
@@ -4691,28 +4903,21 @@
             <a:pPr lvl="0"/>
             <a:r>
               <a:rPr/>
-              <a:t>Rank-based tests: no assumptions about distribution (non-parametric)</a:t>
-            </a:r>
-          </a:p>
-          <a:p>
-            <a:pPr lvl="0"/>
-            <a:r>
-              <a:rPr/>
-              <a:t>Ranks of data: observations assigned ranks, sums (and signs for paired tests) of ranks for groups comparted</a:t>
-            </a:r>
-          </a:p>
-          <a:p>
-            <a:pPr lvl="0"/>
-            <a:r>
-              <a:rPr/>
-              <a:t>Mann-Whitney U test common alternative to independent samples t-test</a:t>
-            </a:r>
-          </a:p>
-          <a:p>
-            <a:pPr lvl="0"/>
-            <a:r>
-              <a:rPr/>
-              <a:t>Wilcoxon signed-rank test is alternative to paired t-test</a:t>
+              <a:t>Permutation tests based on resampling: reshuffling of original data</a:t>
+            </a:r>
+          </a:p>
+          <a:p>
+            <a:pPr lvl="0"/>
+            <a:r>
+              <a:rPr/>
+              <a:t>Resampling allows parameter estimation when distribution unknown, including SEs and CIs of statistics (means, medians)</a:t>
+            </a:r>
+          </a:p>
+          <a:p>
+            <a:pPr lvl="0"/>
+            <a:r>
+              <a:rPr/>
+              <a:t>Common approach is bootstrap: resample sample with replacement many times, recalculate sample stats</a:t>
             </a:r>
           </a:p>
         </p:txBody>
@@ -4767,7 +4972,7 @@
             </a:pPr>
             <a:r>
               <a:rPr/>
-              <a:t>Rank based tests</a:t>
+              <a:t>Permutation tests</a:t>
             </a:r>
           </a:p>
         </p:txBody>
@@ -4790,21 +4995,81 @@
             <a:pPr lvl="0"/>
             <a:r>
               <a:rPr/>
-              <a:t>Assumptions: similar distributions for groups, equal variance</a:t>
-            </a:r>
-          </a:p>
-          <a:p>
-            <a:pPr lvl="0"/>
-            <a:r>
-              <a:rPr/>
-              <a:t>Less power than parametric tests</a:t>
-            </a:r>
-          </a:p>
-          <a:p>
-            <a:pPr lvl="0"/>
-            <a:r>
-              <a:rPr/>
-              <a:t>Best when normality assumption can not be met by transformation (weird distribution) or large outliers</a:t>
+              <a:t>Sample A: n = 40, ȳ= 1.72, s = 4.17</a:t>
+            </a:r>
+          </a:p>
+          <a:p>
+            <a:pPr lvl="0"/>
+            <a:r>
+              <a:rPr/>
+              <a:t>Sample B: n = 35, ȳ= 4.50, s = 4.83</a:t>
+            </a:r>
+          </a:p>
+          <a:p>
+            <a:pPr lvl="0"/>
+            <a:r>
+              <a:rPr/>
+              <a:t>Ho: µ</a:t>
+            </a:r>
+            <a:r>
+              <a:rPr baseline="-25000"/>
+              <a:t>A</a:t>
+            </a:r>
+            <a:r>
+              <a:rPr/>
+              <a:t> = µ</a:t>
+            </a:r>
+            <a:r>
+              <a:rPr baseline="-25000"/>
+              <a:t>B</a:t>
+            </a:r>
+            <a:r>
+              <a:rPr/>
+              <a:t>, Ha: µ</a:t>
+            </a:r>
+            <a:r>
+              <a:rPr baseline="-25000"/>
+              <a:t>A</a:t>
+            </a:r>
+            <a:r>
+              <a:rPr/>
+              <a:t> ≠µ</a:t>
+            </a:r>
+            <a:r>
+              <a:rPr baseline="-25000"/>
+              <a:t>B</a:t>
+            </a:r>
+          </a:p>
+          <a:p>
+            <a:pPr lvl="0"/>
+            <a:r>
+              <a:rPr/>
+              <a:t>Calculate ∆ in means between two groups (2.78)</a:t>
+            </a:r>
+          </a:p>
+        </p:txBody>
+      </p:sp>
+      <p:sp>
+        <p:nvSpPr>
+          <p:cNvPr id="4" name="Content Placeholder 3"/>
+          <p:cNvSpPr>
+            <a:spLocks noGrp="1"/>
+          </p:cNvSpPr>
+          <p:nvPr>
+            <p:ph idx="2" sz="half"/>
+          </p:nvPr>
+        </p:nvSpPr>
+        <p:spPr/>
+        <p:txBody>
+          <a:bodyPr/>
+          <a:lstStyle/>
+          <a:p>
+            <a:pPr lvl="0" indent="0" marL="0">
+              <a:buNone/>
+            </a:pPr>
+            <a:r>
+              <a:rPr/>
+              <a:t>&lt;!– –&gt;</a:t>
             </a:r>
           </a:p>
         </p:txBody>
@@ -4882,21 +5147,60 @@
             <a:pPr lvl="0"/>
             <a:r>
               <a:rPr/>
-              <a:t>Permutation tests based on resampling: reshuffling of original data</a:t>
-            </a:r>
-          </a:p>
-          <a:p>
-            <a:pPr lvl="0"/>
-            <a:r>
-              <a:rPr/>
-              <a:t>Resampling allows parameter estimation when distribution unknown, including SEs and CIs of statistics (means, medians)</a:t>
-            </a:r>
-          </a:p>
-          <a:p>
-            <a:pPr lvl="0"/>
-            <a:r>
-              <a:rPr/>
-              <a:t>Common approach is bootstrap: resample sample with replacement many times, recalculate sample stats</a:t>
+              <a:t>Randomly reshuffle observations between groups (keeping n</a:t>
+            </a:r>
+            <a:r>
+              <a:rPr baseline="-25000"/>
+              <a:t>A</a:t>
+            </a:r>
+            <a:r>
+              <a:rPr/>
+              <a:t>=40 and n</a:t>
+            </a:r>
+            <a:r>
+              <a:rPr baseline="-25000"/>
+              <a:t>B</a:t>
+            </a:r>
+            <a:r>
+              <a:rPr/>
+              <a:t>=35), calculate ∆</a:t>
+            </a:r>
+          </a:p>
+          <a:p>
+            <a:pPr lvl="0"/>
+            <a:r>
+              <a:rPr/>
+              <a:t>Repeat &gt;1,000 times</a:t>
+            </a:r>
+          </a:p>
+          <a:p>
+            <a:pPr lvl="0"/>
+            <a:r>
+              <a:rPr/>
+              <a:t>Record proportion of the ∆means is ≥2.94 µmol</a:t>
+            </a:r>
+          </a:p>
+          <a:p>
+            <a:pPr lvl="0"/>
+            <a:r>
+              <a:rPr/>
+              <a:t>This is equivalent to p-value and can be used in “traditional” H test framework</a:t>
+            </a:r>
+          </a:p>
+          <a:p>
+            <a:pPr lvl="0"/>
+            <a:r>
+              <a:rPr/>
+              <a:t>For a graphical explanation:</a:t>
+            </a:r>
+          </a:p>
+          <a:p>
+            <a:pPr lvl="1"/>
+            <a:r>
+              <a:rPr>
+                <a:hlinkClick r:id="rId2"/>
+              </a:rPr>
+              <a:t>Graphical Explanation</a:t>
             </a:r>
           </a:p>
         </p:txBody>
@@ -4974,56 +5278,21 @@
             <a:pPr lvl="0"/>
             <a:r>
               <a:rPr/>
-              <a:t>Sample A: n = 40, ȳ= 1.72, s = 4.17</a:t>
-            </a:r>
-          </a:p>
-          <a:p>
-            <a:pPr lvl="0"/>
-            <a:r>
-              <a:rPr/>
-              <a:t>Sample B: n = 35, ȳ= 4.50, s = 4.83</a:t>
-            </a:r>
-          </a:p>
-          <a:p>
-            <a:pPr lvl="0"/>
-            <a:r>
-              <a:rPr/>
-              <a:t>Ho: µ</a:t>
-            </a:r>
-            <a:r>
-              <a:rPr baseline="-25000"/>
-              <a:t>A</a:t>
-            </a:r>
-            <a:r>
-              <a:rPr/>
-              <a:t> = µ</a:t>
-            </a:r>
-            <a:r>
-              <a:rPr baseline="-25000"/>
-              <a:t>B</a:t>
-            </a:r>
-            <a:r>
-              <a:rPr/>
-              <a:t>, Ha: µ</a:t>
-            </a:r>
-            <a:r>
-              <a:rPr baseline="-25000"/>
-              <a:t>A</a:t>
-            </a:r>
-            <a:r>
-              <a:rPr/>
-              <a:t> ≠µ</a:t>
-            </a:r>
-            <a:r>
-              <a:rPr baseline="-25000"/>
-              <a:t>B</a:t>
-            </a:r>
-          </a:p>
-          <a:p>
-            <a:pPr lvl="0"/>
-            <a:r>
-              <a:rPr/>
-              <a:t>Calculate ∆ in means bw two groups (2.78)</a:t>
+              <a:t>In R (using ‘perm’ package):</a:t>
+            </a:r>
+          </a:p>
+          <a:p>
+            <a:pPr lvl="0"/>
+            <a:r>
+              <a:rPr/>
+              <a:t>permTS(y1, y2, alternative = “two.sided”, method = “exact.mc”, control = permControl(nmc = 10000))</a:t>
+            </a:r>
+          </a:p>
+          <a:p>
+            <a:pPr lvl="0"/>
+            <a:r>
+              <a:rPr/>
+              <a:t>Assumptions: both groups have similar distribution; equal variance</a:t>
             </a:r>
           </a:p>
         </p:txBody>
@@ -5034,220 +5303,6 @@
 </file>
 
 <file path=ppt/slides/slide25.xml><?xml version="1.0" encoding="utf-8"?>
-<p:sld xmlns:a="http://schemas.openxmlformats.org/drawingml/2006/main" xmlns:r="http://schemas.openxmlformats.org/officeDocument/2006/relationships" xmlns:p="http://schemas.openxmlformats.org/presentationml/2006/main">
-  <p:cSld>
-    <p:spTree>
-      <p:nvGrpSpPr>
-        <p:cNvPr id="1" name=""/>
-        <p:cNvGrpSpPr/>
-        <p:nvPr/>
-      </p:nvGrpSpPr>
-      <p:grpSpPr>
-        <a:xfrm>
-          <a:off x="0" y="0"/>
-          <a:ext cx="0" cy="0"/>
-          <a:chOff x="0" y="0"/>
-          <a:chExt cx="0" cy="0"/>
-        </a:xfrm>
-      </p:grpSpPr>
-      <p:sp>
-        <p:nvSpPr>
-          <p:cNvPr id="2" name="Title 1"/>
-          <p:cNvSpPr>
-            <a:spLocks noGrp="1"/>
-          </p:cNvSpPr>
-          <p:nvPr>
-            <p:ph type="title"/>
-          </p:nvPr>
-        </p:nvSpPr>
-        <p:spPr>
-          <a:xfrm>
-            <a:off x="0" y="0"/>
-            <a:ext cx="9144000" cy="602780"/>
-          </a:xfrm>
-          <a:solidFill>
-            <a:srgbClr val="70121D"/>
-          </a:solidFill>
-        </p:spPr>
-        <p:txBody>
-          <a:bodyPr/>
-          <a:lstStyle/>
-          <a:p>
-            <a:pPr lvl="0" indent="0" marL="0">
-              <a:buNone/>
-            </a:pPr>
-            <a:r>
-              <a:rPr/>
-              <a:t>Permutation tests</a:t>
-            </a:r>
-          </a:p>
-        </p:txBody>
-      </p:sp>
-      <p:sp>
-        <p:nvSpPr>
-          <p:cNvPr id="3" name="Content Placeholder 2"/>
-          <p:cNvSpPr>
-            <a:spLocks noGrp="1"/>
-          </p:cNvSpPr>
-          <p:nvPr>
-            <p:ph idx="1" sz="half"/>
-          </p:nvPr>
-        </p:nvSpPr>
-        <p:spPr/>
-        <p:txBody>
-          <a:bodyPr/>
-          <a:lstStyle/>
-          <a:p>
-            <a:pPr lvl="0"/>
-            <a:r>
-              <a:rPr/>
-              <a:t>Randomly reshuffle observations bw groups (keeping n</a:t>
-            </a:r>
-            <a:r>
-              <a:rPr baseline="-25000"/>
-              <a:t>A</a:t>
-            </a:r>
-            <a:r>
-              <a:rPr/>
-              <a:t>=40 and n</a:t>
-            </a:r>
-            <a:r>
-              <a:rPr baseline="-25000"/>
-              <a:t>B</a:t>
-            </a:r>
-            <a:r>
-              <a:rPr/>
-              <a:t>=35), calculate ∆</a:t>
-            </a:r>
-          </a:p>
-          <a:p>
-            <a:pPr lvl="0"/>
-            <a:r>
-              <a:rPr/>
-              <a:t>Repeat &gt;1,000 times</a:t>
-            </a:r>
-          </a:p>
-          <a:p>
-            <a:pPr lvl="0"/>
-            <a:r>
-              <a:rPr/>
-              <a:t>Record proportion of the ∆means is ≥2.94 µmol</a:t>
-            </a:r>
-          </a:p>
-          <a:p>
-            <a:pPr lvl="0"/>
-            <a:r>
-              <a:rPr/>
-              <a:t>This is equivalent to p-value and can be used in “traditional” H test framework</a:t>
-            </a:r>
-          </a:p>
-          <a:p>
-            <a:pPr lvl="0"/>
-            <a:r>
-              <a:rPr/>
-              <a:t>For a graphical explanation: https://www.jwilber.me/permutationtest/</a:t>
-            </a:r>
-          </a:p>
-        </p:txBody>
-      </p:sp>
-    </p:spTree>
-  </p:cSld>
-</p:sld>
-</file>
-
-<file path=ppt/slides/slide26.xml><?xml version="1.0" encoding="utf-8"?>
-<p:sld xmlns:a="http://schemas.openxmlformats.org/drawingml/2006/main" xmlns:r="http://schemas.openxmlformats.org/officeDocument/2006/relationships" xmlns:p="http://schemas.openxmlformats.org/presentationml/2006/main">
-  <p:cSld>
-    <p:spTree>
-      <p:nvGrpSpPr>
-        <p:cNvPr id="1" name=""/>
-        <p:cNvGrpSpPr/>
-        <p:nvPr/>
-      </p:nvGrpSpPr>
-      <p:grpSpPr>
-        <a:xfrm>
-          <a:off x="0" y="0"/>
-          <a:ext cx="0" cy="0"/>
-          <a:chOff x="0" y="0"/>
-          <a:chExt cx="0" cy="0"/>
-        </a:xfrm>
-      </p:grpSpPr>
-      <p:sp>
-        <p:nvSpPr>
-          <p:cNvPr id="2" name="Title 1"/>
-          <p:cNvSpPr>
-            <a:spLocks noGrp="1"/>
-          </p:cNvSpPr>
-          <p:nvPr>
-            <p:ph type="title"/>
-          </p:nvPr>
-        </p:nvSpPr>
-        <p:spPr>
-          <a:xfrm>
-            <a:off x="0" y="0"/>
-            <a:ext cx="9144000" cy="602780"/>
-          </a:xfrm>
-          <a:solidFill>
-            <a:srgbClr val="70121D"/>
-          </a:solidFill>
-        </p:spPr>
-        <p:txBody>
-          <a:bodyPr/>
-          <a:lstStyle/>
-          <a:p>
-            <a:pPr lvl="0" indent="0" marL="0">
-              <a:buNone/>
-            </a:pPr>
-            <a:r>
-              <a:rPr/>
-              <a:t>Permutation tests</a:t>
-            </a:r>
-          </a:p>
-        </p:txBody>
-      </p:sp>
-      <p:sp>
-        <p:nvSpPr>
-          <p:cNvPr id="3" name="Content Placeholder 2"/>
-          <p:cNvSpPr>
-            <a:spLocks noGrp="1"/>
-          </p:cNvSpPr>
-          <p:nvPr>
-            <p:ph idx="1" sz="half"/>
-          </p:nvPr>
-        </p:nvSpPr>
-        <p:spPr/>
-        <p:txBody>
-          <a:bodyPr/>
-          <a:lstStyle/>
-          <a:p>
-            <a:pPr lvl="0"/>
-            <a:r>
-              <a:rPr/>
-              <a:t>In R (using ‘perm’ package):</a:t>
-            </a:r>
-          </a:p>
-          <a:p>
-            <a:pPr lvl="0"/>
-            <a:r>
-              <a:rPr/>
-              <a:t>permTS(y1, y2, alternative = “two.sided”, method = “exact.mc”, control = permControl(nmc = 10000))</a:t>
-            </a:r>
-          </a:p>
-          <a:p>
-            <a:pPr lvl="0"/>
-            <a:r>
-              <a:rPr/>
-              <a:t>Assumptions: both groups have similar distribution; equal variance</a:t>
-            </a:r>
-          </a:p>
-        </p:txBody>
-      </p:sp>
-    </p:spTree>
-  </p:cSld>
-</p:sld>
-</file>
-
-<file path=ppt/slides/slide27.xml><?xml version="1.0" encoding="utf-8"?>
 <p:sld xmlns:a="http://schemas.openxmlformats.org/drawingml/2006/main" xmlns:r="http://schemas.openxmlformats.org/officeDocument/2006/relationships" xmlns:p="http://schemas.openxmlformats.org/presentationml/2006/main">
   <p:cSld>
     <p:spTree>
@@ -6049,14 +6104,14 @@
             </a:r>
           </a:p>
           <a:p>
-            <a:pPr lvl="0"/>
+            <a:pPr lvl="1"/>
             <a:r>
               <a:rPr/>
               <a:t>Graphical tests: boxplots</a:t>
             </a:r>
           </a:p>
           <a:p>
-            <a:pPr lvl="0"/>
+            <a:pPr lvl="1"/>
             <a:r>
               <a:rPr/>
               <a:t>“Formal” tests: F-ratio test</a:t>

</xml_diff>